<commit_message>
partial prep for the day
</commit_message>
<xml_diff>
--- a/format-encodings/documents/ARCHIVE/floating-point-encoding.pptx
+++ b/format-encodings/documents/ARCHIVE/floating-point-encoding.pptx
@@ -5,26 +5,25 @@
     <p:sldMasterId id="2147483659" r:id="rId1"/>
   </p:sldMasterIdLst>
   <p:notesMasterIdLst>
-    <p:notesMasterId r:id="rId9"/>
+    <p:notesMasterId r:id="rId8"/>
   </p:notesMasterIdLst>
   <p:sldIdLst>
     <p:sldId id="256" r:id="rId2"/>
     <p:sldId id="257" r:id="rId3"/>
     <p:sldId id="258" r:id="rId4"/>
     <p:sldId id="259" r:id="rId5"/>
-    <p:sldId id="260" r:id="rId6"/>
-    <p:sldId id="261" r:id="rId7"/>
-    <p:sldId id="262" r:id="rId8"/>
+    <p:sldId id="261" r:id="rId6"/>
+    <p:sldId id="262" r:id="rId7"/>
   </p:sldIdLst>
   <p:sldSz cx="9144000" cy="5143500" type="screen16x9"/>
   <p:notesSz cx="6858000" cy="9144000"/>
   <p:embeddedFontLst>
     <p:embeddedFont>
       <p:font typeface="Source Code Pro" panose="020B0509030403020204" pitchFamily="49" charset="0"/>
-      <p:regular r:id="rId10"/>
-      <p:bold r:id="rId11"/>
-      <p:italic r:id="rId12"/>
-      <p:boldItalic r:id="rId13"/>
+      <p:regular r:id="rId9"/>
+      <p:bold r:id="rId10"/>
+      <p:italic r:id="rId11"/>
+      <p:boldItalic r:id="rId12"/>
     </p:embeddedFont>
   </p:embeddedFontLst>
   <p:defaultTextStyle>
@@ -745,7 +744,7 @@
         </p:nvSpPr>
         <p:spPr>
           <a:xfrm>
-            <a:off x="381300" y="685800"/>
+            <a:off x="381000" y="685800"/>
             <a:ext cx="6096000" cy="3429000"/>
           </a:xfrm>
           <a:custGeom>
@@ -1137,110 +1136,6 @@
   <p:cSld>
     <p:spTree>
       <p:nvGrpSpPr>
-        <p:cNvPr id="1" name="Shape 123"/>
-        <p:cNvGrpSpPr/>
-        <p:nvPr/>
-      </p:nvGrpSpPr>
-      <p:grpSpPr>
-        <a:xfrm>
-          <a:off x="0" y="0"/>
-          <a:ext cx="0" cy="0"/>
-          <a:chOff x="0" y="0"/>
-          <a:chExt cx="0" cy="0"/>
-        </a:xfrm>
-      </p:grpSpPr>
-      <p:sp>
-        <p:nvSpPr>
-          <p:cNvPr id="124" name="Google Shape;124;gf1bcb9d487_0_1062:notes"/>
-          <p:cNvSpPr>
-            <a:spLocks noGrp="1" noRot="1" noChangeAspect="1"/>
-          </p:cNvSpPr>
-          <p:nvPr>
-            <p:ph type="sldImg" idx="2"/>
-          </p:nvPr>
-        </p:nvSpPr>
-        <p:spPr>
-          <a:xfrm>
-            <a:off x="381000" y="685800"/>
-            <a:ext cx="6096000" cy="3429000"/>
-          </a:xfrm>
-          <a:custGeom>
-            <a:avLst/>
-            <a:gdLst/>
-            <a:ahLst/>
-            <a:cxnLst/>
-            <a:rect l="l" t="t" r="r" b="b"/>
-            <a:pathLst>
-              <a:path w="120000" h="120000" extrusionOk="0">
-                <a:moveTo>
-                  <a:pt x="0" y="0"/>
-                </a:moveTo>
-                <a:lnTo>
-                  <a:pt x="120000" y="0"/>
-                </a:lnTo>
-                <a:lnTo>
-                  <a:pt x="120000" y="120000"/>
-                </a:lnTo>
-                <a:lnTo>
-                  <a:pt x="0" y="120000"/>
-                </a:lnTo>
-                <a:close/>
-              </a:path>
-            </a:pathLst>
-          </a:custGeom>
-        </p:spPr>
-      </p:sp>
-      <p:sp>
-        <p:nvSpPr>
-          <p:cNvPr id="125" name="Google Shape;125;gf1bcb9d487_0_1062:notes"/>
-          <p:cNvSpPr txBox="1">
-            <a:spLocks noGrp="1"/>
-          </p:cNvSpPr>
-          <p:nvPr>
-            <p:ph type="body" idx="1"/>
-          </p:nvPr>
-        </p:nvSpPr>
-        <p:spPr>
-          <a:xfrm>
-            <a:off x="685800" y="4343400"/>
-            <a:ext cx="5486400" cy="4114800"/>
-          </a:xfrm>
-          <a:prstGeom prst="rect">
-            <a:avLst/>
-          </a:prstGeom>
-        </p:spPr>
-        <p:txBody>
-          <a:bodyPr spcFirstLastPara="1" wrap="square" lIns="91425" tIns="91425" rIns="91425" bIns="91425" anchor="t" anchorCtr="0">
-            <a:noAutofit/>
-          </a:bodyPr>
-          <a:lstStyle/>
-          <a:p>
-            <a:pPr marL="0" lvl="0" indent="0" algn="l" rtl="0">
-              <a:spcBef>
-                <a:spcPts val="0"/>
-              </a:spcBef>
-              <a:spcAft>
-                <a:spcPts val="0"/>
-              </a:spcAft>
-              <a:buNone/>
-            </a:pPr>
-            <a:endParaRPr/>
-          </a:p>
-        </p:txBody>
-      </p:sp>
-    </p:spTree>
-  </p:cSld>
-  <p:clrMapOvr>
-    <a:masterClrMapping/>
-  </p:clrMapOvr>
-</p:notes>
-</file>
-
-<file path=ppt/notesSlides/notesSlide6.xml><?xml version="1.0" encoding="utf-8"?>
-<p:notes xmlns:a="http://schemas.openxmlformats.org/drawingml/2006/main" xmlns:r="http://schemas.openxmlformats.org/officeDocument/2006/relationships" xmlns:p="http://schemas.openxmlformats.org/presentationml/2006/main" showMasterSp="0" showMasterPhAnim="0">
-  <p:cSld>
-    <p:spTree>
-      <p:nvGrpSpPr>
         <p:cNvPr id="1" name="Shape 130"/>
         <p:cNvGrpSpPr/>
         <p:nvPr/>
@@ -1340,7 +1235,7 @@
 </p:notes>
 </file>
 
-<file path=ppt/notesSlides/notesSlide7.xml><?xml version="1.0" encoding="utf-8"?>
+<file path=ppt/notesSlides/notesSlide6.xml><?xml version="1.0" encoding="utf-8"?>
 <p:notes xmlns:a="http://schemas.openxmlformats.org/drawingml/2006/main" xmlns:r="http://schemas.openxmlformats.org/officeDocument/2006/relationships" xmlns:p="http://schemas.openxmlformats.org/presentationml/2006/main" showMasterSp="0" showMasterPhAnim="0">
   <p:cSld>
     <p:spTree>
@@ -6288,10 +6183,10 @@
               <a:buChar char="●"/>
             </a:pPr>
             <a:r>
-              <a:rPr lang="en"/>
+              <a:rPr lang="en" dirty="0"/>
               <a:t>Recall the Universal Computer</a:t>
             </a:r>
-            <a:endParaRPr/>
+            <a:endParaRPr dirty="0"/>
           </a:p>
           <a:p>
             <a:pPr marL="914400" lvl="1" indent="-317500" algn="l" rtl="0">
@@ -6305,10 +6200,10 @@
               <a:buChar char="○"/>
             </a:pPr>
             <a:r>
-              <a:rPr lang="en"/>
+              <a:rPr lang="en" dirty="0"/>
               <a:t>There is a limited tape size to perform calculation</a:t>
             </a:r>
-            <a:endParaRPr/>
+            <a:endParaRPr dirty="0"/>
           </a:p>
           <a:p>
             <a:pPr marL="457200" lvl="0" indent="-342900" algn="l" rtl="0">
@@ -6322,10 +6217,10 @@
               <a:buChar char="●"/>
             </a:pPr>
             <a:r>
-              <a:rPr lang="en"/>
+              <a:rPr lang="en" dirty="0"/>
               <a:t>Recall the von Neumann and Harvard architecture</a:t>
             </a:r>
-            <a:endParaRPr/>
+            <a:endParaRPr dirty="0"/>
           </a:p>
           <a:p>
             <a:pPr marL="914400" lvl="1" indent="-317500" algn="l" rtl="0">
@@ -6339,10 +6234,10 @@
               <a:buChar char="○"/>
             </a:pPr>
             <a:r>
-              <a:rPr lang="en"/>
+              <a:rPr lang="en" dirty="0"/>
               <a:t>There is a predefined width to registers and memory</a:t>
             </a:r>
-            <a:endParaRPr/>
+            <a:endParaRPr dirty="0"/>
           </a:p>
           <a:p>
             <a:pPr marL="457200" lvl="0" indent="-342900" algn="l" rtl="0">
@@ -6356,10 +6251,10 @@
               <a:buChar char="●"/>
             </a:pPr>
             <a:r>
-              <a:rPr lang="en"/>
+              <a:rPr lang="en" dirty="0"/>
               <a:t>Abstract representations with limited sizes for:</a:t>
             </a:r>
-            <a:endParaRPr/>
+            <a:endParaRPr dirty="0"/>
           </a:p>
           <a:p>
             <a:pPr marL="914400" lvl="1" indent="-317500" algn="l" rtl="0">
@@ -6373,10 +6268,10 @@
               <a:buChar char="○"/>
             </a:pPr>
             <a:r>
-              <a:rPr lang="en"/>
+              <a:rPr lang="en" dirty="0"/>
               <a:t>Natural Numbers &amp; Zero:	unsigned char, unsigned int</a:t>
             </a:r>
-            <a:endParaRPr/>
+            <a:endParaRPr dirty="0"/>
           </a:p>
           <a:p>
             <a:pPr marL="914400" lvl="1" indent="-317500" algn="l" rtl="0">
@@ -6390,10 +6285,10 @@
               <a:buChar char="○"/>
             </a:pPr>
             <a:r>
-              <a:rPr lang="en"/>
-              <a:t>Integers:				short int, int, long int</a:t>
+              <a:rPr lang="en" dirty="0"/>
+              <a:t>Integers:			short, int, long</a:t>
             </a:r>
-            <a:endParaRPr/>
+            <a:endParaRPr lang="en-US" dirty="0"/>
           </a:p>
           <a:p>
             <a:pPr marL="914400" lvl="1" indent="-317500" algn="l" rtl="0">
@@ -6407,10 +6302,9 @@
               <a:buChar char="○"/>
             </a:pPr>
             <a:r>
-              <a:rPr lang="en"/>
+              <a:rPr lang="en-US" dirty="0"/>
               <a:t>Rational/Real:</a:t>
             </a:r>
-            <a:endParaRPr/>
           </a:p>
           <a:p>
             <a:pPr marL="1371600" lvl="2" indent="-317500" algn="l" rtl="0">
@@ -6424,10 +6318,10 @@
               <a:buChar char="■"/>
             </a:pPr>
             <a:r>
-              <a:rPr lang="en"/>
-              <a:t>Fix Point			---</a:t>
+              <a:rPr lang="en" dirty="0"/>
+              <a:t>Fix Point		---</a:t>
             </a:r>
-            <a:endParaRPr/>
+            <a:endParaRPr dirty="0"/>
           </a:p>
           <a:p>
             <a:pPr marL="1371600" lvl="2" indent="-317500" algn="l" rtl="0">
@@ -6441,13 +6335,13 @@
               <a:buChar char="■"/>
             </a:pPr>
             <a:r>
-              <a:rPr lang="en"/>
+              <a:rPr lang="en" dirty="0"/>
               <a:t>Floating Point		float, double</a:t>
             </a:r>
             <a:br>
-              <a:rPr lang="en"/>
+              <a:rPr lang="en" dirty="0"/>
             </a:br>
-            <a:endParaRPr/>
+            <a:endParaRPr dirty="0"/>
           </a:p>
           <a:p>
             <a:pPr marL="457200" lvl="0" indent="-342900" algn="l" rtl="0">
@@ -6461,10 +6355,10 @@
               <a:buChar char="●"/>
             </a:pPr>
             <a:r>
-              <a:rPr lang="en"/>
+              <a:rPr lang="en" dirty="0"/>
               <a:t>An encoding of each will include one or more of the following:</a:t>
             </a:r>
-            <a:endParaRPr/>
+            <a:endParaRPr dirty="0"/>
           </a:p>
         </p:txBody>
       </p:sp>
@@ -7251,15 +7145,7 @@
             </a:pPr>
             <a:r>
               <a:rPr lang="en" sz="1800" dirty="0"/>
-              <a:t>Note the whole part is </a:t>
-            </a:r>
-            <a:r>
-              <a:rPr lang="en" sz="1800" dirty="0" err="1"/>
-              <a:t>alway</a:t>
-            </a:r>
-            <a:r>
-              <a:rPr lang="en" sz="1800" dirty="0"/>
-              <a:t> "1", so I left it out!</a:t>
+              <a:t>Note the whole part is always "1", so I left it out!</a:t>
             </a:r>
             <a:endParaRPr sz="1800" baseline="30000" dirty="0"/>
           </a:p>
@@ -8540,8 +8426,8 @@
         </p:nvSpPr>
         <p:spPr>
           <a:xfrm>
-            <a:off x="3012300" y="1614650"/>
-            <a:ext cx="695070" cy="223200"/>
+            <a:off x="2988237" y="1614650"/>
+            <a:ext cx="605195" cy="223200"/>
           </a:xfrm>
           <a:prstGeom prst="rect">
             <a:avLst/>
@@ -10279,6 +10165,7 @@
         <p:nvCxnSpPr>
           <p:cNvPr id="109" name="Google Shape;109;p15"/>
           <p:cNvCxnSpPr>
+            <a:cxnSpLocks/>
             <a:endCxn id="108" idx="1"/>
           </p:cNvCxnSpPr>
           <p:nvPr/>
@@ -10860,8 +10747,16 @@
               <a:buChar char="○"/>
             </a:pPr>
             <a:r>
+              <a:rPr lang="en-US" dirty="0"/>
+              <a:t>C</a:t>
+            </a:r>
+            <a:r>
+              <a:rPr lang="en" dirty="0" err="1"/>
+              <a:t>oefficient</a:t>
+            </a:r>
+            <a:r>
               <a:rPr lang="en" dirty="0"/>
-              <a:t>significant or the mantissa:  00101</a:t>
+              <a:t>: “1.00101” and the mantissa: “00101”</a:t>
             </a:r>
             <a:endParaRPr dirty="0"/>
           </a:p>
@@ -18130,388 +18025,6 @@
           </a:graphicData>
         </a:graphic>
       </p:graphicFrame>
-      <p:graphicFrame>
-        <p:nvGraphicFramePr>
-          <p:cNvPr id="122" name="Google Shape;122;p16"/>
-          <p:cNvGraphicFramePr/>
-          <p:nvPr/>
-        </p:nvGraphicFramePr>
-        <p:xfrm>
-          <a:off x="4666975" y="193350"/>
-          <a:ext cx="3619600" cy="396210"/>
-        </p:xfrm>
-        <a:graphic>
-          <a:graphicData uri="http://schemas.openxmlformats.org/drawingml/2006/table">
-            <a:tbl>
-              <a:tblPr>
-                <a:noFill/>
-                <a:tableStyleId>{8068E1F2-1D8B-4646-BC7E-4773431AA47D}</a:tableStyleId>
-              </a:tblPr>
-              <a:tblGrid>
-                <a:gridCol w="452450">
-                  <a:extLst>
-                    <a:ext uri="{9D8B030D-6E8A-4147-A177-3AD203B41FA5}">
-                      <a16:colId xmlns:a16="http://schemas.microsoft.com/office/drawing/2014/main" val="20000"/>
-                    </a:ext>
-                  </a:extLst>
-                </a:gridCol>
-                <a:gridCol w="452450">
-                  <a:extLst>
-                    <a:ext uri="{9D8B030D-6E8A-4147-A177-3AD203B41FA5}">
-                      <a16:colId xmlns:a16="http://schemas.microsoft.com/office/drawing/2014/main" val="20001"/>
-                    </a:ext>
-                  </a:extLst>
-                </a:gridCol>
-                <a:gridCol w="452450">
-                  <a:extLst>
-                    <a:ext uri="{9D8B030D-6E8A-4147-A177-3AD203B41FA5}">
-                      <a16:colId xmlns:a16="http://schemas.microsoft.com/office/drawing/2014/main" val="20002"/>
-                    </a:ext>
-                  </a:extLst>
-                </a:gridCol>
-                <a:gridCol w="452450">
-                  <a:extLst>
-                    <a:ext uri="{9D8B030D-6E8A-4147-A177-3AD203B41FA5}">
-                      <a16:colId xmlns:a16="http://schemas.microsoft.com/office/drawing/2014/main" val="20003"/>
-                    </a:ext>
-                  </a:extLst>
-                </a:gridCol>
-                <a:gridCol w="452450">
-                  <a:extLst>
-                    <a:ext uri="{9D8B030D-6E8A-4147-A177-3AD203B41FA5}">
-                      <a16:colId xmlns:a16="http://schemas.microsoft.com/office/drawing/2014/main" val="20004"/>
-                    </a:ext>
-                  </a:extLst>
-                </a:gridCol>
-                <a:gridCol w="452450">
-                  <a:extLst>
-                    <a:ext uri="{9D8B030D-6E8A-4147-A177-3AD203B41FA5}">
-                      <a16:colId xmlns:a16="http://schemas.microsoft.com/office/drawing/2014/main" val="20005"/>
-                    </a:ext>
-                  </a:extLst>
-                </a:gridCol>
-                <a:gridCol w="452450">
-                  <a:extLst>
-                    <a:ext uri="{9D8B030D-6E8A-4147-A177-3AD203B41FA5}">
-                      <a16:colId xmlns:a16="http://schemas.microsoft.com/office/drawing/2014/main" val="20006"/>
-                    </a:ext>
-                  </a:extLst>
-                </a:gridCol>
-                <a:gridCol w="452450">
-                  <a:extLst>
-                    <a:ext uri="{9D8B030D-6E8A-4147-A177-3AD203B41FA5}">
-                      <a16:colId xmlns:a16="http://schemas.microsoft.com/office/drawing/2014/main" val="20007"/>
-                    </a:ext>
-                  </a:extLst>
-                </a:gridCol>
-              </a:tblGrid>
-              <a:tr h="381000">
-                <a:tc>
-                  <a:txBody>
-                    <a:bodyPr/>
-                    <a:lstStyle/>
-                    <a:p>
-                      <a:pPr marL="0" lvl="0" indent="0" algn="ctr" rtl="0">
-                        <a:spcBef>
-                          <a:spcPts val="0"/>
-                        </a:spcBef>
-                        <a:spcAft>
-                          <a:spcPts val="0"/>
-                        </a:spcAft>
-                        <a:buNone/>
-                      </a:pPr>
-                      <a:r>
-                        <a:rPr lang="en">
-                          <a:latin typeface="Source Code Pro"/>
-                          <a:ea typeface="Source Code Pro"/>
-                          <a:cs typeface="Source Code Pro"/>
-                          <a:sym typeface="Source Code Pro"/>
-                        </a:rPr>
-                        <a:t>1</a:t>
-                      </a:r>
-                      <a:endParaRPr>
-                        <a:latin typeface="Source Code Pro"/>
-                        <a:ea typeface="Source Code Pro"/>
-                        <a:cs typeface="Source Code Pro"/>
-                        <a:sym typeface="Source Code Pro"/>
-                      </a:endParaRPr>
-                    </a:p>
-                  </a:txBody>
-                  <a:tcPr marL="91425" marR="91425" marT="91425" marB="91425">
-                    <a:solidFill>
-                      <a:srgbClr val="00FF00"/>
-                    </a:solidFill>
-                  </a:tcPr>
-                </a:tc>
-                <a:tc>
-                  <a:txBody>
-                    <a:bodyPr/>
-                    <a:lstStyle/>
-                    <a:p>
-                      <a:pPr marL="0" lvl="0" indent="0" algn="ctr" rtl="0">
-                        <a:spcBef>
-                          <a:spcPts val="0"/>
-                        </a:spcBef>
-                        <a:spcAft>
-                          <a:spcPts val="0"/>
-                        </a:spcAft>
-                        <a:buNone/>
-                      </a:pPr>
-                      <a:r>
-                        <a:rPr lang="en">
-                          <a:latin typeface="Source Code Pro"/>
-                          <a:ea typeface="Source Code Pro"/>
-                          <a:cs typeface="Source Code Pro"/>
-                          <a:sym typeface="Source Code Pro"/>
-                        </a:rPr>
-                        <a:t>e</a:t>
-                      </a:r>
-                      <a:endParaRPr>
-                        <a:latin typeface="Source Code Pro"/>
-                        <a:ea typeface="Source Code Pro"/>
-                        <a:cs typeface="Source Code Pro"/>
-                        <a:sym typeface="Source Code Pro"/>
-                      </a:endParaRPr>
-                    </a:p>
-                  </a:txBody>
-                  <a:tcPr marL="91425" marR="91425" marT="91425" marB="91425">
-                    <a:solidFill>
-                      <a:srgbClr val="FFFF00"/>
-                    </a:solidFill>
-                  </a:tcPr>
-                </a:tc>
-                <a:tc>
-                  <a:txBody>
-                    <a:bodyPr/>
-                    <a:lstStyle/>
-                    <a:p>
-                      <a:pPr marL="0" lvl="0" indent="0" algn="ctr" rtl="0">
-                        <a:spcBef>
-                          <a:spcPts val="0"/>
-                        </a:spcBef>
-                        <a:spcAft>
-                          <a:spcPts val="0"/>
-                        </a:spcAft>
-                        <a:buNone/>
-                      </a:pPr>
-                      <a:r>
-                        <a:rPr lang="en">
-                          <a:latin typeface="Source Code Pro"/>
-                          <a:ea typeface="Source Code Pro"/>
-                          <a:cs typeface="Source Code Pro"/>
-                          <a:sym typeface="Source Code Pro"/>
-                        </a:rPr>
-                        <a:t>e</a:t>
-                      </a:r>
-                      <a:endParaRPr>
-                        <a:latin typeface="Source Code Pro"/>
-                        <a:ea typeface="Source Code Pro"/>
-                        <a:cs typeface="Source Code Pro"/>
-                        <a:sym typeface="Source Code Pro"/>
-                      </a:endParaRPr>
-                    </a:p>
-                  </a:txBody>
-                  <a:tcPr marL="91425" marR="91425" marT="91425" marB="91425">
-                    <a:solidFill>
-                      <a:srgbClr val="FFFF00"/>
-                    </a:solidFill>
-                  </a:tcPr>
-                </a:tc>
-                <a:tc>
-                  <a:txBody>
-                    <a:bodyPr/>
-                    <a:lstStyle/>
-                    <a:p>
-                      <a:pPr marL="0" lvl="0" indent="0" algn="ctr" rtl="0">
-                        <a:spcBef>
-                          <a:spcPts val="0"/>
-                        </a:spcBef>
-                        <a:spcAft>
-                          <a:spcPts val="0"/>
-                        </a:spcAft>
-                        <a:buNone/>
-                      </a:pPr>
-                      <a:r>
-                        <a:rPr lang="en">
-                          <a:latin typeface="Source Code Pro"/>
-                          <a:ea typeface="Source Code Pro"/>
-                          <a:cs typeface="Source Code Pro"/>
-                          <a:sym typeface="Source Code Pro"/>
-                        </a:rPr>
-                        <a:t>e</a:t>
-                      </a:r>
-                      <a:endParaRPr>
-                        <a:latin typeface="Source Code Pro"/>
-                        <a:ea typeface="Source Code Pro"/>
-                        <a:cs typeface="Source Code Pro"/>
-                        <a:sym typeface="Source Code Pro"/>
-                      </a:endParaRPr>
-                    </a:p>
-                  </a:txBody>
-                  <a:tcPr marL="91425" marR="91425" marT="91425" marB="91425">
-                    <a:solidFill>
-                      <a:srgbClr val="FFFF00"/>
-                    </a:solidFill>
-                  </a:tcPr>
-                </a:tc>
-                <a:tc>
-                  <a:txBody>
-                    <a:bodyPr/>
-                    <a:lstStyle/>
-                    <a:p>
-                      <a:pPr marL="0" lvl="0" indent="0" algn="ctr" rtl="0">
-                        <a:spcBef>
-                          <a:spcPts val="0"/>
-                        </a:spcBef>
-                        <a:spcAft>
-                          <a:spcPts val="0"/>
-                        </a:spcAft>
-                        <a:buNone/>
-                      </a:pPr>
-                      <a:r>
-                        <a:rPr lang="en">
-                          <a:latin typeface="Source Code Pro"/>
-                          <a:ea typeface="Source Code Pro"/>
-                          <a:cs typeface="Source Code Pro"/>
-                          <a:sym typeface="Source Code Pro"/>
-                        </a:rPr>
-                        <a:t>0</a:t>
-                      </a:r>
-                      <a:endParaRPr>
-                        <a:latin typeface="Source Code Pro"/>
-                        <a:ea typeface="Source Code Pro"/>
-                        <a:cs typeface="Source Code Pro"/>
-                        <a:sym typeface="Source Code Pro"/>
-                      </a:endParaRPr>
-                    </a:p>
-                  </a:txBody>
-                  <a:tcPr marL="91425" marR="91425" marT="91425" marB="91425">
-                    <a:solidFill>
-                      <a:schemeClr val="accent1"/>
-                    </a:solidFill>
-                  </a:tcPr>
-                </a:tc>
-                <a:tc>
-                  <a:txBody>
-                    <a:bodyPr/>
-                    <a:lstStyle/>
-                    <a:p>
-                      <a:pPr marL="0" lvl="0" indent="0" algn="ctr" rtl="0">
-                        <a:spcBef>
-                          <a:spcPts val="0"/>
-                        </a:spcBef>
-                        <a:spcAft>
-                          <a:spcPts val="0"/>
-                        </a:spcAft>
-                        <a:buNone/>
-                      </a:pPr>
-                      <a:r>
-                        <a:rPr lang="en">
-                          <a:latin typeface="Source Code Pro"/>
-                          <a:ea typeface="Source Code Pro"/>
-                          <a:cs typeface="Source Code Pro"/>
-                          <a:sym typeface="Source Code Pro"/>
-                        </a:rPr>
-                        <a:t>1</a:t>
-                      </a:r>
-                      <a:endParaRPr>
-                        <a:latin typeface="Source Code Pro"/>
-                        <a:ea typeface="Source Code Pro"/>
-                        <a:cs typeface="Source Code Pro"/>
-                        <a:sym typeface="Source Code Pro"/>
-                      </a:endParaRPr>
-                    </a:p>
-                  </a:txBody>
-                  <a:tcPr marL="91425" marR="91425" marT="91425" marB="91425">
-                    <a:solidFill>
-                      <a:schemeClr val="accent1"/>
-                    </a:solidFill>
-                  </a:tcPr>
-                </a:tc>
-                <a:tc>
-                  <a:txBody>
-                    <a:bodyPr/>
-                    <a:lstStyle/>
-                    <a:p>
-                      <a:pPr marL="0" lvl="0" indent="0" algn="ctr" rtl="0">
-                        <a:spcBef>
-                          <a:spcPts val="0"/>
-                        </a:spcBef>
-                        <a:spcAft>
-                          <a:spcPts val="0"/>
-                        </a:spcAft>
-                        <a:buNone/>
-                      </a:pPr>
-                      <a:r>
-                        <a:rPr lang="en">
-                          <a:latin typeface="Source Code Pro"/>
-                          <a:ea typeface="Source Code Pro"/>
-                          <a:cs typeface="Source Code Pro"/>
-                          <a:sym typeface="Source Code Pro"/>
-                        </a:rPr>
-                        <a:t>0</a:t>
-                      </a:r>
-                      <a:endParaRPr>
-                        <a:latin typeface="Source Code Pro"/>
-                        <a:ea typeface="Source Code Pro"/>
-                        <a:cs typeface="Source Code Pro"/>
-                        <a:sym typeface="Source Code Pro"/>
-                      </a:endParaRPr>
-                    </a:p>
-                  </a:txBody>
-                  <a:tcPr marL="91425" marR="91425" marT="91425" marB="91425">
-                    <a:solidFill>
-                      <a:schemeClr val="accent1"/>
-                    </a:solidFill>
-                  </a:tcPr>
-                </a:tc>
-                <a:tc>
-                  <a:txBody>
-                    <a:bodyPr/>
-                    <a:lstStyle/>
-                    <a:p>
-                      <a:pPr marL="0" lvl="0" indent="0" algn="ctr" rtl="0">
-                        <a:spcBef>
-                          <a:spcPts val="0"/>
-                        </a:spcBef>
-                        <a:spcAft>
-                          <a:spcPts val="0"/>
-                        </a:spcAft>
-                        <a:buNone/>
-                      </a:pPr>
-                      <a:r>
-                        <a:rPr lang="en">
-                          <a:latin typeface="Source Code Pro"/>
-                          <a:ea typeface="Source Code Pro"/>
-                          <a:cs typeface="Source Code Pro"/>
-                          <a:sym typeface="Source Code Pro"/>
-                        </a:rPr>
-                        <a:t>0</a:t>
-                      </a:r>
-                      <a:endParaRPr>
-                        <a:latin typeface="Source Code Pro"/>
-                        <a:ea typeface="Source Code Pro"/>
-                        <a:cs typeface="Source Code Pro"/>
-                        <a:sym typeface="Source Code Pro"/>
-                      </a:endParaRPr>
-                    </a:p>
-                  </a:txBody>
-                  <a:tcPr marL="91425" marR="91425" marT="91425" marB="91425">
-                    <a:solidFill>
-                      <a:schemeClr val="accent1"/>
-                    </a:solidFill>
-                  </a:tcPr>
-                </a:tc>
-                <a:extLst>
-                  <a:ext uri="{0D108BD9-81ED-4DB2-BD59-A6C34878D82A}">
-                    <a16:rowId xmlns:a16="http://schemas.microsoft.com/office/drawing/2014/main" val="10000"/>
-                  </a:ext>
-                </a:extLst>
-              </a:tr>
-            </a:tbl>
-          </a:graphicData>
-        </a:graphic>
-      </p:graphicFrame>
     </p:spTree>
   </p:cSld>
   <p:clrMapOvr>
@@ -18521,786 +18034,6 @@
 </file>
 
 <file path=ppt/slides/slide5.xml><?xml version="1.0" encoding="utf-8"?>
-<p:sld xmlns:a="http://schemas.openxmlformats.org/drawingml/2006/main" xmlns:r="http://schemas.openxmlformats.org/officeDocument/2006/relationships" xmlns:p="http://schemas.openxmlformats.org/presentationml/2006/main">
-  <p:cSld>
-    <p:spTree>
-      <p:nvGrpSpPr>
-        <p:cNvPr id="1" name="Shape 126"/>
-        <p:cNvGrpSpPr/>
-        <p:nvPr/>
-      </p:nvGrpSpPr>
-      <p:grpSpPr>
-        <a:xfrm>
-          <a:off x="0" y="0"/>
-          <a:ext cx="0" cy="0"/>
-          <a:chOff x="0" y="0"/>
-          <a:chExt cx="0" cy="0"/>
-        </a:xfrm>
-      </p:grpSpPr>
-      <p:sp>
-        <p:nvSpPr>
-          <p:cNvPr id="127" name="Google Shape;127;p17"/>
-          <p:cNvSpPr txBox="1">
-            <a:spLocks noGrp="1"/>
-          </p:cNvSpPr>
-          <p:nvPr>
-            <p:ph type="title"/>
-          </p:nvPr>
-        </p:nvSpPr>
-        <p:spPr>
-          <a:xfrm>
-            <a:off x="311700" y="445025"/>
-            <a:ext cx="8520600" cy="572700"/>
-          </a:xfrm>
-          <a:prstGeom prst="rect">
-            <a:avLst/>
-          </a:prstGeom>
-        </p:spPr>
-        <p:txBody>
-          <a:bodyPr spcFirstLastPara="1" wrap="square" lIns="91425" tIns="91425" rIns="91425" bIns="91425" anchor="t" anchorCtr="0">
-            <a:normAutofit fontScale="90000"/>
-          </a:bodyPr>
-          <a:lstStyle/>
-          <a:p>
-            <a:pPr marL="0" lvl="0" indent="0" algn="l" rtl="0">
-              <a:spcBef>
-                <a:spcPts val="0"/>
-              </a:spcBef>
-              <a:spcAft>
-                <a:spcPts val="0"/>
-              </a:spcAft>
-              <a:buNone/>
-            </a:pPr>
-            <a:r>
-              <a:rPr lang="en"/>
-              <a:t>Floating Point Encoding</a:t>
-            </a:r>
-            <a:endParaRPr/>
-          </a:p>
-        </p:txBody>
-      </p:sp>
-      <p:sp>
-        <p:nvSpPr>
-          <p:cNvPr id="128" name="Google Shape;128;p17"/>
-          <p:cNvSpPr txBox="1">
-            <a:spLocks noGrp="1"/>
-          </p:cNvSpPr>
-          <p:nvPr>
-            <p:ph type="body" idx="1"/>
-          </p:nvPr>
-        </p:nvSpPr>
-        <p:spPr>
-          <a:xfrm>
-            <a:off x="311700" y="1152475"/>
-            <a:ext cx="8520600" cy="3416400"/>
-          </a:xfrm>
-          <a:prstGeom prst="rect">
-            <a:avLst/>
-          </a:prstGeom>
-        </p:spPr>
-        <p:txBody>
-          <a:bodyPr spcFirstLastPara="1" wrap="square" lIns="91425" tIns="91425" rIns="91425" bIns="91425" anchor="t" anchorCtr="0">
-            <a:normAutofit/>
-          </a:bodyPr>
-          <a:lstStyle/>
-          <a:p>
-            <a:pPr marL="0" lvl="0" indent="0" algn="l" rtl="0">
-              <a:spcBef>
-                <a:spcPts val="0"/>
-              </a:spcBef>
-              <a:spcAft>
-                <a:spcPts val="0"/>
-              </a:spcAft>
-              <a:buNone/>
-            </a:pPr>
-            <a:r>
-              <a:rPr lang="en" dirty="0"/>
-              <a:t>Recall Scientific Notation:   - 1.00101  x 2 </a:t>
-            </a:r>
-            <a:r>
-              <a:rPr lang="en" baseline="30000" dirty="0"/>
-              <a:t>-100 (4)</a:t>
-            </a:r>
-            <a:endParaRPr dirty="0"/>
-          </a:p>
-          <a:p>
-            <a:pPr marL="457200" lvl="0" indent="-342900" algn="l" rtl="0">
-              <a:spcBef>
-                <a:spcPts val="1200"/>
-              </a:spcBef>
-              <a:spcAft>
-                <a:spcPts val="0"/>
-              </a:spcAft>
-              <a:buSzPts val="1800"/>
-              <a:buChar char="●"/>
-            </a:pPr>
-            <a:r>
-              <a:rPr lang="en" dirty="0"/>
-              <a:t>Consider a new format:  c122f8 (quarter)</a:t>
-            </a:r>
-            <a:endParaRPr dirty="0"/>
-          </a:p>
-          <a:p>
-            <a:pPr marL="914400" lvl="1" indent="-317500" algn="l" rtl="0">
-              <a:spcBef>
-                <a:spcPts val="0"/>
-              </a:spcBef>
-              <a:spcAft>
-                <a:spcPts val="0"/>
-              </a:spcAft>
-              <a:buSzPts val="1400"/>
-              <a:buChar char="○"/>
-            </a:pPr>
-            <a:r>
-              <a:rPr lang="en" dirty="0"/>
-              <a:t>c122f8</a:t>
-            </a:r>
-            <a:r>
-              <a:rPr lang="en" sz="1400" dirty="0"/>
-              <a:t> (quarter):  	</a:t>
-            </a:r>
-            <a:r>
-              <a:rPr lang="en" sz="1400" dirty="0">
-                <a:latin typeface="Source Code Pro"/>
-                <a:ea typeface="Source Code Pro"/>
-                <a:cs typeface="Source Code Pro"/>
-                <a:sym typeface="Source Code Pro"/>
-              </a:rPr>
-              <a:t>1 +  </a:t>
-            </a:r>
-            <a:r>
-              <a:rPr lang="en" dirty="0">
-                <a:latin typeface="Source Code Pro"/>
-                <a:ea typeface="Source Code Pro"/>
-                <a:cs typeface="Source Code Pro"/>
-                <a:sym typeface="Source Code Pro"/>
-              </a:rPr>
-              <a:t>3</a:t>
-            </a:r>
-            <a:r>
-              <a:rPr lang="en" sz="1400" dirty="0">
-                <a:latin typeface="Source Code Pro"/>
-                <a:ea typeface="Source Code Pro"/>
-                <a:cs typeface="Source Code Pro"/>
-                <a:sym typeface="Source Code Pro"/>
-              </a:rPr>
-              <a:t> + </a:t>
-            </a:r>
-            <a:r>
-              <a:rPr lang="en" dirty="0">
-                <a:latin typeface="Source Code Pro"/>
-                <a:ea typeface="Source Code Pro"/>
-                <a:cs typeface="Source Code Pro"/>
-                <a:sym typeface="Source Code Pro"/>
-              </a:rPr>
-              <a:t>4</a:t>
-            </a:r>
-            <a:r>
-              <a:rPr lang="en" sz="1400" dirty="0">
-                <a:latin typeface="Source Code Pro"/>
-                <a:ea typeface="Source Code Pro"/>
-                <a:cs typeface="Source Code Pro"/>
-                <a:sym typeface="Source Code Pro"/>
-              </a:rPr>
-              <a:t> = </a:t>
-            </a:r>
-            <a:r>
-              <a:rPr lang="en" dirty="0">
-                <a:latin typeface="Source Code Pro"/>
-                <a:ea typeface="Source Code Pro"/>
-                <a:cs typeface="Source Code Pro"/>
-                <a:sym typeface="Source Code Pro"/>
-              </a:rPr>
-              <a:t>8</a:t>
-            </a:r>
-            <a:r>
-              <a:rPr lang="en" sz="1400" dirty="0">
-                <a:latin typeface="Source Code Pro"/>
-                <a:ea typeface="Source Code Pro"/>
-                <a:cs typeface="Source Code Pro"/>
-                <a:sym typeface="Source Code Pro"/>
-              </a:rPr>
-              <a:t>,        011 = </a:t>
-            </a:r>
-            <a:r>
-              <a:rPr lang="en" dirty="0">
-                <a:latin typeface="Source Code Pro"/>
-                <a:ea typeface="Source Code Pro"/>
-                <a:cs typeface="Source Code Pro"/>
-                <a:sym typeface="Source Code Pro"/>
-              </a:rPr>
-              <a:t>3</a:t>
-            </a:r>
-            <a:br>
-              <a:rPr lang="en" sz="1400" dirty="0">
-                <a:latin typeface="Source Code Pro"/>
-                <a:ea typeface="Source Code Pro"/>
-                <a:cs typeface="Source Code Pro"/>
-                <a:sym typeface="Source Code Pro"/>
-              </a:rPr>
-            </a:br>
-            <a:endParaRPr dirty="0">
-              <a:latin typeface="Source Code Pro"/>
-              <a:ea typeface="Source Code Pro"/>
-              <a:cs typeface="Source Code Pro"/>
-              <a:sym typeface="Source Code Pro"/>
-            </a:endParaRPr>
-          </a:p>
-          <a:p>
-            <a:pPr marL="457200" lvl="0" indent="-342900" algn="l" rtl="0">
-              <a:spcBef>
-                <a:spcPts val="0"/>
-              </a:spcBef>
-              <a:spcAft>
-                <a:spcPts val="0"/>
-              </a:spcAft>
-              <a:buSzPts val="1800"/>
-              <a:buChar char="●"/>
-            </a:pPr>
-            <a:r>
-              <a:rPr lang="en" dirty="0">
-                <a:latin typeface="Source Code Pro"/>
-                <a:ea typeface="Source Code Pro"/>
-                <a:cs typeface="Source Code Pro"/>
-                <a:sym typeface="Source Code Pro"/>
-              </a:rPr>
-              <a:t>Components</a:t>
-            </a:r>
-            <a:endParaRPr dirty="0">
-              <a:latin typeface="Source Code Pro"/>
-              <a:ea typeface="Source Code Pro"/>
-              <a:cs typeface="Source Code Pro"/>
-              <a:sym typeface="Source Code Pro"/>
-            </a:endParaRPr>
-          </a:p>
-          <a:p>
-            <a:pPr marL="914400" lvl="1" indent="-317500" algn="l" rtl="0">
-              <a:spcBef>
-                <a:spcPts val="0"/>
-              </a:spcBef>
-              <a:spcAft>
-                <a:spcPts val="0"/>
-              </a:spcAft>
-              <a:buSzPts val="1400"/>
-              <a:buChar char="○"/>
-            </a:pPr>
-            <a:r>
-              <a:rPr lang="en" dirty="0">
-                <a:latin typeface="Source Code Pro"/>
-                <a:ea typeface="Source Code Pro"/>
-                <a:cs typeface="Source Code Pro"/>
-                <a:sym typeface="Source Code Pro"/>
-              </a:rPr>
-              <a:t>sign: 1</a:t>
-            </a:r>
-            <a:endParaRPr dirty="0">
-              <a:latin typeface="Source Code Pro"/>
-              <a:ea typeface="Source Code Pro"/>
-              <a:cs typeface="Source Code Pro"/>
-              <a:sym typeface="Source Code Pro"/>
-            </a:endParaRPr>
-          </a:p>
-          <a:p>
-            <a:pPr marL="914400" lvl="1" indent="-317500" algn="l" rtl="0">
-              <a:spcBef>
-                <a:spcPts val="0"/>
-              </a:spcBef>
-              <a:spcAft>
-                <a:spcPts val="0"/>
-              </a:spcAft>
-              <a:buSzPts val="1400"/>
-              <a:buChar char="○"/>
-            </a:pPr>
-            <a:r>
-              <a:rPr lang="en" dirty="0">
-                <a:latin typeface="Source Code Pro"/>
-                <a:ea typeface="Source Code Pro"/>
-                <a:cs typeface="Source Code Pro"/>
-                <a:sym typeface="Source Code Pro"/>
-              </a:rPr>
-              <a:t>mantissa: 0010</a:t>
-            </a:r>
-            <a:r>
-              <a:rPr lang="en" strike="sngStrike" dirty="0">
-                <a:latin typeface="Source Code Pro"/>
-                <a:ea typeface="Source Code Pro"/>
-                <a:cs typeface="Source Code Pro"/>
-                <a:sym typeface="Source Code Pro"/>
-              </a:rPr>
-              <a:t>010</a:t>
-            </a:r>
-            <a:r>
-              <a:rPr lang="en" dirty="0">
-                <a:latin typeface="Source Code Pro"/>
-                <a:ea typeface="Source Code Pro"/>
-                <a:cs typeface="Source Code Pro"/>
-                <a:sym typeface="Source Code Pro"/>
-              </a:rPr>
-              <a:t> ;     Drop the extra bits.</a:t>
-            </a:r>
-            <a:endParaRPr dirty="0">
-              <a:latin typeface="Source Code Pro"/>
-              <a:ea typeface="Source Code Pro"/>
-              <a:cs typeface="Source Code Pro"/>
-              <a:sym typeface="Source Code Pro"/>
-            </a:endParaRPr>
-          </a:p>
-          <a:p>
-            <a:pPr marL="914400" lvl="1" indent="-317500" algn="l" rtl="0">
-              <a:spcBef>
-                <a:spcPts val="0"/>
-              </a:spcBef>
-              <a:spcAft>
-                <a:spcPts val="0"/>
-              </a:spcAft>
-              <a:buSzPts val="1400"/>
-              <a:buChar char="○"/>
-            </a:pPr>
-            <a:r>
-              <a:rPr lang="en" dirty="0" err="1">
-                <a:latin typeface="Source Code Pro"/>
-                <a:ea typeface="Source Code Pro"/>
-                <a:cs typeface="Source Code Pro"/>
-                <a:sym typeface="Source Code Pro"/>
-              </a:rPr>
-              <a:t>expon</a:t>
-            </a:r>
-            <a:r>
-              <a:rPr lang="en" dirty="0">
-                <a:latin typeface="Source Code Pro"/>
-                <a:ea typeface="Source Code Pro"/>
-                <a:cs typeface="Source Code Pro"/>
-                <a:sym typeface="Source Code Pro"/>
-              </a:rPr>
-              <a:t>:  -4 + 3 = -1    </a:t>
-            </a:r>
-            <a:r>
-              <a:rPr lang="en" dirty="0" err="1">
-                <a:latin typeface="Source Code Pro"/>
-                <a:ea typeface="Source Code Pro"/>
-                <a:cs typeface="Source Code Pro"/>
-                <a:sym typeface="Source Code Pro"/>
-              </a:rPr>
-              <a:t>Opps</a:t>
-            </a:r>
-            <a:r>
-              <a:rPr lang="en" dirty="0">
-                <a:latin typeface="Source Code Pro"/>
-                <a:ea typeface="Source Code Pro"/>
-                <a:cs typeface="Source Code Pro"/>
-                <a:sym typeface="Source Code Pro"/>
-              </a:rPr>
-              <a:t>, number is two small.</a:t>
-            </a:r>
-            <a:br>
-              <a:rPr lang="en" dirty="0">
-                <a:latin typeface="Source Code Pro"/>
-                <a:ea typeface="Source Code Pro"/>
-                <a:cs typeface="Source Code Pro"/>
-                <a:sym typeface="Source Code Pro"/>
-              </a:rPr>
-            </a:br>
-            <a:endParaRPr dirty="0"/>
-          </a:p>
-        </p:txBody>
-      </p:sp>
-      <p:graphicFrame>
-        <p:nvGraphicFramePr>
-          <p:cNvPr id="129" name="Google Shape;129;p17"/>
-          <p:cNvGraphicFramePr/>
-          <p:nvPr>
-            <p:extLst>
-              <p:ext uri="{D42A27DB-BD31-4B8C-83A1-F6EECF244321}">
-                <p14:modId xmlns:p14="http://schemas.microsoft.com/office/powerpoint/2010/main" val="4036821417"/>
-              </p:ext>
-            </p:extLst>
-          </p:nvPr>
-        </p:nvGraphicFramePr>
-        <p:xfrm>
-          <a:off x="639072" y="3989084"/>
-          <a:ext cx="3619600" cy="396210"/>
-        </p:xfrm>
-        <a:graphic>
-          <a:graphicData uri="http://schemas.openxmlformats.org/drawingml/2006/table">
-            <a:tbl>
-              <a:tblPr>
-                <a:noFill/>
-                <a:tableStyleId>{8068E1F2-1D8B-4646-BC7E-4773431AA47D}</a:tableStyleId>
-              </a:tblPr>
-              <a:tblGrid>
-                <a:gridCol w="452450">
-                  <a:extLst>
-                    <a:ext uri="{9D8B030D-6E8A-4147-A177-3AD203B41FA5}">
-                      <a16:colId xmlns:a16="http://schemas.microsoft.com/office/drawing/2014/main" val="20000"/>
-                    </a:ext>
-                  </a:extLst>
-                </a:gridCol>
-                <a:gridCol w="452450">
-                  <a:extLst>
-                    <a:ext uri="{9D8B030D-6E8A-4147-A177-3AD203B41FA5}">
-                      <a16:colId xmlns:a16="http://schemas.microsoft.com/office/drawing/2014/main" val="20001"/>
-                    </a:ext>
-                  </a:extLst>
-                </a:gridCol>
-                <a:gridCol w="452450">
-                  <a:extLst>
-                    <a:ext uri="{9D8B030D-6E8A-4147-A177-3AD203B41FA5}">
-                      <a16:colId xmlns:a16="http://schemas.microsoft.com/office/drawing/2014/main" val="20002"/>
-                    </a:ext>
-                  </a:extLst>
-                </a:gridCol>
-                <a:gridCol w="452450">
-                  <a:extLst>
-                    <a:ext uri="{9D8B030D-6E8A-4147-A177-3AD203B41FA5}">
-                      <a16:colId xmlns:a16="http://schemas.microsoft.com/office/drawing/2014/main" val="20003"/>
-                    </a:ext>
-                  </a:extLst>
-                </a:gridCol>
-                <a:gridCol w="452450">
-                  <a:extLst>
-                    <a:ext uri="{9D8B030D-6E8A-4147-A177-3AD203B41FA5}">
-                      <a16:colId xmlns:a16="http://schemas.microsoft.com/office/drawing/2014/main" val="20004"/>
-                    </a:ext>
-                  </a:extLst>
-                </a:gridCol>
-                <a:gridCol w="452450">
-                  <a:extLst>
-                    <a:ext uri="{9D8B030D-6E8A-4147-A177-3AD203B41FA5}">
-                      <a16:colId xmlns:a16="http://schemas.microsoft.com/office/drawing/2014/main" val="20005"/>
-                    </a:ext>
-                  </a:extLst>
-                </a:gridCol>
-                <a:gridCol w="452450">
-                  <a:extLst>
-                    <a:ext uri="{9D8B030D-6E8A-4147-A177-3AD203B41FA5}">
-                      <a16:colId xmlns:a16="http://schemas.microsoft.com/office/drawing/2014/main" val="20006"/>
-                    </a:ext>
-                  </a:extLst>
-                </a:gridCol>
-                <a:gridCol w="452450">
-                  <a:extLst>
-                    <a:ext uri="{9D8B030D-6E8A-4147-A177-3AD203B41FA5}">
-                      <a16:colId xmlns:a16="http://schemas.microsoft.com/office/drawing/2014/main" val="20007"/>
-                    </a:ext>
-                  </a:extLst>
-                </a:gridCol>
-              </a:tblGrid>
-              <a:tr h="381000">
-                <a:tc>
-                  <a:txBody>
-                    <a:bodyPr/>
-                    <a:lstStyle/>
-                    <a:p>
-                      <a:pPr marL="0" lvl="0" indent="0" algn="ctr" rtl="0">
-                        <a:spcBef>
-                          <a:spcPts val="0"/>
-                        </a:spcBef>
-                        <a:spcAft>
-                          <a:spcPts val="0"/>
-                        </a:spcAft>
-                        <a:buNone/>
-                      </a:pPr>
-                      <a:r>
-                        <a:rPr lang="en">
-                          <a:latin typeface="Source Code Pro"/>
-                          <a:ea typeface="Source Code Pro"/>
-                          <a:cs typeface="Source Code Pro"/>
-                          <a:sym typeface="Source Code Pro"/>
-                        </a:rPr>
-                        <a:t>1</a:t>
-                      </a:r>
-                      <a:endParaRPr>
-                        <a:latin typeface="Source Code Pro"/>
-                        <a:ea typeface="Source Code Pro"/>
-                        <a:cs typeface="Source Code Pro"/>
-                        <a:sym typeface="Source Code Pro"/>
-                      </a:endParaRPr>
-                    </a:p>
-                  </a:txBody>
-                  <a:tcPr marL="91425" marR="91425" marT="91425" marB="91425">
-                    <a:solidFill>
-                      <a:srgbClr val="00FF00"/>
-                    </a:solidFill>
-                  </a:tcPr>
-                </a:tc>
-                <a:tc>
-                  <a:txBody>
-                    <a:bodyPr/>
-                    <a:lstStyle/>
-                    <a:p>
-                      <a:pPr marL="0" lvl="0" indent="0" algn="ctr" rtl="0">
-                        <a:spcBef>
-                          <a:spcPts val="0"/>
-                        </a:spcBef>
-                        <a:spcAft>
-                          <a:spcPts val="0"/>
-                        </a:spcAft>
-                        <a:buNone/>
-                      </a:pPr>
-                      <a:r>
-                        <a:rPr lang="en">
-                          <a:latin typeface="Source Code Pro"/>
-                          <a:ea typeface="Source Code Pro"/>
-                          <a:cs typeface="Source Code Pro"/>
-                          <a:sym typeface="Source Code Pro"/>
-                        </a:rPr>
-                        <a:t>e</a:t>
-                      </a:r>
-                      <a:endParaRPr>
-                        <a:latin typeface="Source Code Pro"/>
-                        <a:ea typeface="Source Code Pro"/>
-                        <a:cs typeface="Source Code Pro"/>
-                        <a:sym typeface="Source Code Pro"/>
-                      </a:endParaRPr>
-                    </a:p>
-                  </a:txBody>
-                  <a:tcPr marL="91425" marR="91425" marT="91425" marB="91425">
-                    <a:solidFill>
-                      <a:srgbClr val="FFFF00"/>
-                    </a:solidFill>
-                  </a:tcPr>
-                </a:tc>
-                <a:tc>
-                  <a:txBody>
-                    <a:bodyPr/>
-                    <a:lstStyle/>
-                    <a:p>
-                      <a:pPr marL="0" lvl="0" indent="0" algn="ctr" rtl="0">
-                        <a:spcBef>
-                          <a:spcPts val="0"/>
-                        </a:spcBef>
-                        <a:spcAft>
-                          <a:spcPts val="0"/>
-                        </a:spcAft>
-                        <a:buNone/>
-                      </a:pPr>
-                      <a:r>
-                        <a:rPr lang="en">
-                          <a:latin typeface="Source Code Pro"/>
-                          <a:ea typeface="Source Code Pro"/>
-                          <a:cs typeface="Source Code Pro"/>
-                          <a:sym typeface="Source Code Pro"/>
-                        </a:rPr>
-                        <a:t>e</a:t>
-                      </a:r>
-                      <a:endParaRPr>
-                        <a:latin typeface="Source Code Pro"/>
-                        <a:ea typeface="Source Code Pro"/>
-                        <a:cs typeface="Source Code Pro"/>
-                        <a:sym typeface="Source Code Pro"/>
-                      </a:endParaRPr>
-                    </a:p>
-                  </a:txBody>
-                  <a:tcPr marL="91425" marR="91425" marT="91425" marB="91425">
-                    <a:solidFill>
-                      <a:srgbClr val="FFFF00"/>
-                    </a:solidFill>
-                  </a:tcPr>
-                </a:tc>
-                <a:tc>
-                  <a:txBody>
-                    <a:bodyPr/>
-                    <a:lstStyle/>
-                    <a:p>
-                      <a:pPr marL="0" lvl="0" indent="0" algn="ctr" rtl="0">
-                        <a:spcBef>
-                          <a:spcPts val="0"/>
-                        </a:spcBef>
-                        <a:spcAft>
-                          <a:spcPts val="0"/>
-                        </a:spcAft>
-                        <a:buNone/>
-                      </a:pPr>
-                      <a:r>
-                        <a:rPr lang="en">
-                          <a:latin typeface="Source Code Pro"/>
-                          <a:ea typeface="Source Code Pro"/>
-                          <a:cs typeface="Source Code Pro"/>
-                          <a:sym typeface="Source Code Pro"/>
-                        </a:rPr>
-                        <a:t>e</a:t>
-                      </a:r>
-                      <a:endParaRPr>
-                        <a:latin typeface="Source Code Pro"/>
-                        <a:ea typeface="Source Code Pro"/>
-                        <a:cs typeface="Source Code Pro"/>
-                        <a:sym typeface="Source Code Pro"/>
-                      </a:endParaRPr>
-                    </a:p>
-                  </a:txBody>
-                  <a:tcPr marL="91425" marR="91425" marT="91425" marB="91425">
-                    <a:solidFill>
-                      <a:srgbClr val="FFFF00"/>
-                    </a:solidFill>
-                  </a:tcPr>
-                </a:tc>
-                <a:tc>
-                  <a:txBody>
-                    <a:bodyPr/>
-                    <a:lstStyle/>
-                    <a:p>
-                      <a:pPr marL="0" lvl="0" indent="0" algn="ctr" rtl="0">
-                        <a:spcBef>
-                          <a:spcPts val="0"/>
-                        </a:spcBef>
-                        <a:spcAft>
-                          <a:spcPts val="0"/>
-                        </a:spcAft>
-                        <a:buNone/>
-                      </a:pPr>
-                      <a:r>
-                        <a:rPr lang="en">
-                          <a:latin typeface="Source Code Pro"/>
-                          <a:ea typeface="Source Code Pro"/>
-                          <a:cs typeface="Source Code Pro"/>
-                          <a:sym typeface="Source Code Pro"/>
-                        </a:rPr>
-                        <a:t>0</a:t>
-                      </a:r>
-                      <a:endParaRPr>
-                        <a:latin typeface="Source Code Pro"/>
-                        <a:ea typeface="Source Code Pro"/>
-                        <a:cs typeface="Source Code Pro"/>
-                        <a:sym typeface="Source Code Pro"/>
-                      </a:endParaRPr>
-                    </a:p>
-                  </a:txBody>
-                  <a:tcPr marL="91425" marR="91425" marT="91425" marB="91425">
-                    <a:solidFill>
-                      <a:schemeClr val="accent1"/>
-                    </a:solidFill>
-                  </a:tcPr>
-                </a:tc>
-                <a:tc>
-                  <a:txBody>
-                    <a:bodyPr/>
-                    <a:lstStyle/>
-                    <a:p>
-                      <a:pPr marL="0" lvl="0" indent="0" algn="ctr" rtl="0">
-                        <a:spcBef>
-                          <a:spcPts val="0"/>
-                        </a:spcBef>
-                        <a:spcAft>
-                          <a:spcPts val="0"/>
-                        </a:spcAft>
-                        <a:buNone/>
-                      </a:pPr>
-                      <a:r>
-                        <a:rPr lang="en" dirty="0">
-                          <a:latin typeface="Source Code Pro"/>
-                          <a:ea typeface="Source Code Pro"/>
-                          <a:cs typeface="Source Code Pro"/>
-                          <a:sym typeface="Source Code Pro"/>
-                        </a:rPr>
-                        <a:t>0</a:t>
-                      </a:r>
-                      <a:endParaRPr dirty="0">
-                        <a:latin typeface="Source Code Pro"/>
-                        <a:ea typeface="Source Code Pro"/>
-                        <a:cs typeface="Source Code Pro"/>
-                        <a:sym typeface="Source Code Pro"/>
-                      </a:endParaRPr>
-                    </a:p>
-                  </a:txBody>
-                  <a:tcPr marL="91425" marR="91425" marT="91425" marB="91425">
-                    <a:solidFill>
-                      <a:schemeClr val="accent1"/>
-                    </a:solidFill>
-                  </a:tcPr>
-                </a:tc>
-                <a:tc>
-                  <a:txBody>
-                    <a:bodyPr/>
-                    <a:lstStyle/>
-                    <a:p>
-                      <a:pPr marL="0" lvl="0" indent="0" algn="ctr" rtl="0">
-                        <a:spcBef>
-                          <a:spcPts val="0"/>
-                        </a:spcBef>
-                        <a:spcAft>
-                          <a:spcPts val="0"/>
-                        </a:spcAft>
-                        <a:buNone/>
-                      </a:pPr>
-                      <a:r>
-                        <a:rPr lang="en" dirty="0">
-                          <a:latin typeface="Source Code Pro"/>
-                          <a:ea typeface="Source Code Pro"/>
-                          <a:cs typeface="Source Code Pro"/>
-                          <a:sym typeface="Source Code Pro"/>
-                        </a:rPr>
-                        <a:t>1</a:t>
-                      </a:r>
-                      <a:endParaRPr dirty="0">
-                        <a:latin typeface="Source Code Pro"/>
-                        <a:ea typeface="Source Code Pro"/>
-                        <a:cs typeface="Source Code Pro"/>
-                        <a:sym typeface="Source Code Pro"/>
-                      </a:endParaRPr>
-                    </a:p>
-                  </a:txBody>
-                  <a:tcPr marL="91425" marR="91425" marT="91425" marB="91425">
-                    <a:solidFill>
-                      <a:schemeClr val="accent1"/>
-                    </a:solidFill>
-                  </a:tcPr>
-                </a:tc>
-                <a:tc>
-                  <a:txBody>
-                    <a:bodyPr/>
-                    <a:lstStyle/>
-                    <a:p>
-                      <a:pPr marL="0" lvl="0" indent="0" algn="ctr" rtl="0">
-                        <a:spcBef>
-                          <a:spcPts val="0"/>
-                        </a:spcBef>
-                        <a:spcAft>
-                          <a:spcPts val="0"/>
-                        </a:spcAft>
-                        <a:buNone/>
-                      </a:pPr>
-                      <a:r>
-                        <a:rPr lang="en" dirty="0">
-                          <a:latin typeface="Source Code Pro"/>
-                          <a:ea typeface="Source Code Pro"/>
-                          <a:cs typeface="Source Code Pro"/>
-                          <a:sym typeface="Source Code Pro"/>
-                        </a:rPr>
-                        <a:t>0</a:t>
-                      </a:r>
-                      <a:endParaRPr dirty="0">
-                        <a:latin typeface="Source Code Pro"/>
-                        <a:ea typeface="Source Code Pro"/>
-                        <a:cs typeface="Source Code Pro"/>
-                        <a:sym typeface="Source Code Pro"/>
-                      </a:endParaRPr>
-                    </a:p>
-                  </a:txBody>
-                  <a:tcPr marL="91425" marR="91425" marT="91425" marB="91425">
-                    <a:solidFill>
-                      <a:schemeClr val="accent1"/>
-                    </a:solidFill>
-                  </a:tcPr>
-                </a:tc>
-                <a:extLst>
-                  <a:ext uri="{0D108BD9-81ED-4DB2-BD59-A6C34878D82A}">
-                    <a16:rowId xmlns:a16="http://schemas.microsoft.com/office/drawing/2014/main" val="10000"/>
-                  </a:ext>
-                </a:extLst>
-              </a:tr>
-            </a:tbl>
-          </a:graphicData>
-        </a:graphic>
-      </p:graphicFrame>
-    </p:spTree>
-  </p:cSld>
-  <p:clrMapOvr>
-    <a:masterClrMapping/>
-  </p:clrMapOvr>
-</p:sld>
-</file>
-
-<file path=ppt/slides/slide6.xml><?xml version="1.0" encoding="utf-8"?>
 <p:sld xmlns:a="http://schemas.openxmlformats.org/drawingml/2006/main" xmlns:r="http://schemas.openxmlformats.org/officeDocument/2006/relationships" xmlns:p="http://schemas.openxmlformats.org/presentationml/2006/main">
   <p:cSld>
     <p:spTree>
@@ -20327,7 +19060,7 @@
 </p:sld>
 </file>
 
-<file path=ppt/slides/slide7.xml><?xml version="1.0" encoding="utf-8"?>
+<file path=ppt/slides/slide6.xml><?xml version="1.0" encoding="utf-8"?>
 <p:sld xmlns:a="http://schemas.openxmlformats.org/drawingml/2006/main" xmlns:r="http://schemas.openxmlformats.org/officeDocument/2006/relationships" xmlns:p="http://schemas.openxmlformats.org/presentationml/2006/main">
   <p:cSld>
     <p:spTree>

</xml_diff>